<commit_message>
Make the presentation automatic
</commit_message>
<xml_diff>
--- a/Documents/Presentation.pptx
+++ b/Documents/Presentation.pptx
@@ -584,6 +584,67 @@
 </file>
 
 <file path=ppt/notesSlides/notesSlide1.xml><?xml version="1.0" encoding="utf-8"?>
+<p:notes xmlns:a="http://schemas.openxmlformats.org/drawingml/2006/main" xmlns:r="http://schemas.openxmlformats.org/officeDocument/2006/relationships" xmlns:p="http://schemas.openxmlformats.org/presentationml/2006/main">
+  <p:cSld>
+    <p:spTree>
+      <p:nvGrpSpPr>
+        <p:cNvPr id="1" name=""/>
+        <p:cNvGrpSpPr/>
+        <p:nvPr/>
+      </p:nvGrpSpPr>
+      <p:grpSpPr>
+        <a:xfrm>
+          <a:off x="0" y="0"/>
+          <a:ext cx="0" cy="0"/>
+          <a:chOff x="0" y="0"/>
+          <a:chExt cx="0" cy="0"/>
+        </a:xfrm>
+      </p:grpSpPr>
+      <p:sp>
+        <p:nvSpPr>
+          <p:cNvPr id="2" name="Slide Image Placeholder 1"/>
+          <p:cNvSpPr>
+            <a:spLocks noGrp="1" noRot="1" noChangeAspect="1"/>
+          </p:cNvSpPr>
+          <p:nvPr>
+            <p:ph type="sldImg"/>
+          </p:nvPr>
+        </p:nvSpPr>
+        <p:spPr/>
+      </p:sp>
+      <p:sp>
+        <p:nvSpPr>
+          <p:cNvPr id="3" name="Notes Placeholder 2"/>
+          <p:cNvSpPr>
+            <a:spLocks noGrp="1"/>
+          </p:cNvSpPr>
+          <p:nvPr>
+            <p:ph type="body" idx="1"/>
+          </p:nvPr>
+        </p:nvSpPr>
+        <p:spPr/>
+        <p:txBody>
+          <a:bodyPr/>
+          <a:lstStyle/>
+          <a:p>
+            <a:endParaRPr lang="en-US" dirty="0"/>
+          </a:p>
+        </p:txBody>
+      </p:sp>
+    </p:spTree>
+    <p:extLst>
+      <p:ext uri="{BB962C8B-B14F-4D97-AF65-F5344CB8AC3E}">
+        <p14:creationId xmlns:p14="http://schemas.microsoft.com/office/powerpoint/2010/main" val="770408299"/>
+      </p:ext>
+    </p:extLst>
+  </p:cSld>
+  <p:clrMapOvr>
+    <a:masterClrMapping/>
+  </p:clrMapOvr>
+</p:notes>
+</file>
+
+<file path=ppt/notesSlides/notesSlide2.xml><?xml version="1.0" encoding="utf-8"?>
 <p:notes xmlns:a="http://schemas.openxmlformats.org/drawingml/2006/main" xmlns:r="http://schemas.openxmlformats.org/officeDocument/2006/relationships" xmlns:p="http://schemas.openxmlformats.org/presentationml/2006/main" showMasterSp="0" showMasterPhAnim="0">
   <p:cSld>
     <p:spTree>
@@ -692,7 +753,7 @@
 </p:notes>
 </file>
 
-<file path=ppt/notesSlides/notesSlide2.xml><?xml version="1.0" encoding="utf-8"?>
+<file path=ppt/notesSlides/notesSlide3.xml><?xml version="1.0" encoding="utf-8"?>
 <p:notes xmlns:a="http://schemas.openxmlformats.org/drawingml/2006/main" xmlns:r="http://schemas.openxmlformats.org/officeDocument/2006/relationships" xmlns:p="http://schemas.openxmlformats.org/presentationml/2006/main" showMasterSp="0" showMasterPhAnim="0">
   <p:cSld>
     <p:spTree>
@@ -801,7 +862,7 @@
 </p:notes>
 </file>
 
-<file path=ppt/notesSlides/notesSlide3.xml><?xml version="1.0" encoding="utf-8"?>
+<file path=ppt/notesSlides/notesSlide4.xml><?xml version="1.0" encoding="utf-8"?>
 <p:notes xmlns:a="http://schemas.openxmlformats.org/drawingml/2006/main" xmlns:r="http://schemas.openxmlformats.org/officeDocument/2006/relationships" xmlns:p="http://schemas.openxmlformats.org/presentationml/2006/main" showMasterSp="0" showMasterPhAnim="0">
   <p:cSld>
     <p:spTree>
@@ -910,7 +971,7 @@
 </p:notes>
 </file>
 
-<file path=ppt/notesSlides/notesSlide4.xml><?xml version="1.0" encoding="utf-8"?>
+<file path=ppt/notesSlides/notesSlide5.xml><?xml version="1.0" encoding="utf-8"?>
 <p:notes xmlns:a="http://schemas.openxmlformats.org/drawingml/2006/main" xmlns:r="http://schemas.openxmlformats.org/officeDocument/2006/relationships" xmlns:p="http://schemas.openxmlformats.org/presentationml/2006/main" showMasterSp="0" showMasterPhAnim="0">
   <p:cSld>
     <p:spTree>
@@ -1227,7 +1288,7 @@
 </p:notes>
 </file>
 
-<file path=ppt/notesSlides/notesSlide5.xml><?xml version="1.0" encoding="utf-8"?>
+<file path=ppt/notesSlides/notesSlide6.xml><?xml version="1.0" encoding="utf-8"?>
 <p:notes xmlns:a="http://schemas.openxmlformats.org/drawingml/2006/main" xmlns:r="http://schemas.openxmlformats.org/officeDocument/2006/relationships" xmlns:p="http://schemas.openxmlformats.org/presentationml/2006/main" showMasterSp="0" showMasterPhAnim="0">
   <p:cSld>
     <p:spTree>
@@ -1466,7 +1527,7 @@
 </p:notes>
 </file>
 
-<file path=ppt/notesSlides/notesSlide6.xml><?xml version="1.0" encoding="utf-8"?>
+<file path=ppt/notesSlides/notesSlide7.xml><?xml version="1.0" encoding="utf-8"?>
 <p:notes xmlns:a="http://schemas.openxmlformats.org/drawingml/2006/main" xmlns:r="http://schemas.openxmlformats.org/officeDocument/2006/relationships" xmlns:p="http://schemas.openxmlformats.org/presentationml/2006/main" showMasterSp="0" showMasterPhAnim="0">
   <p:cSld>
     <p:spTree>
@@ -1558,7 +1619,7 @@
               </a:spcAft>
               <a:buNone/>
             </a:pPr>
-            <a:endParaRPr/>
+            <a:endParaRPr dirty="0"/>
           </a:p>
         </p:txBody>
       </p:sp>
@@ -10173,6 +10234,44 @@
           </a:fontRef>
         </p:style>
       </p:cxnSp>
+      <p:pic>
+        <p:nvPicPr>
+          <p:cNvPr id="2" name="1 Mar, 10.11">
+            <a:hlinkClick r:id="" action="ppaction://media"/>
+            <a:extLst>
+              <a:ext uri="{FF2B5EF4-FFF2-40B4-BE49-F238E27FC236}">
+                <a16:creationId xmlns:a16="http://schemas.microsoft.com/office/drawing/2014/main" id="{BC6C7D07-59BD-41AB-AE01-FA9760DACCD6}"/>
+              </a:ext>
+            </a:extLst>
+          </p:cNvPr>
+          <p:cNvPicPr>
+            <a:picLocks noChangeAspect="1"/>
+          </p:cNvPicPr>
+          <p:nvPr>
+            <a:audioFile r:link="rId2"/>
+            <p:extLst>
+              <p:ext uri="{DAA4B4D4-6D71-4841-9C94-3DE7FCFB9230}">
+                <p14:media xmlns:p14="http://schemas.microsoft.com/office/powerpoint/2010/main" r:embed="rId1"/>
+              </p:ext>
+            </p:extLst>
+          </p:nvPr>
+        </p:nvPicPr>
+        <p:blipFill>
+          <a:blip r:embed="rId5"/>
+          <a:stretch>
+            <a:fillRect/>
+          </a:stretch>
+        </p:blipFill>
+        <p:spPr>
+          <a:xfrm>
+            <a:off x="441158" y="4145510"/>
+            <a:ext cx="609600" cy="609600"/>
+          </a:xfrm>
+          <a:prstGeom prst="rect">
+            <a:avLst/>
+          </a:prstGeom>
+        </p:spPr>
+      </p:pic>
     </p:spTree>
     <p:extLst>
       <p:ext uri="{BB962C8B-B14F-4D97-AF65-F5344CB8AC3E}">
@@ -10183,6 +10282,18 @@
   <p:clrMapOvr>
     <a:overrideClrMapping bg1="lt1" tx1="dk1" bg2="lt2" tx2="dk2" accent1="accent1" accent2="accent2" accent3="accent3" accent4="accent4" accent5="accent5" accent6="accent6" hlink="hlink" folHlink="folHlink"/>
   </p:clrMapOvr>
+  <mc:AlternateContent xmlns:mc="http://schemas.openxmlformats.org/markup-compatibility/2006">
+    <mc:Choice xmlns:p159="http://schemas.microsoft.com/office/powerpoint/2015/09/main" Requires="p159">
+      <p:transition xmlns:p14="http://schemas.microsoft.com/office/powerpoint/2010/main" spd="slow" p14:dur="2000" advClick="0" advTm="3000">
+        <p159:morph option="byObject"/>
+      </p:transition>
+    </mc:Choice>
+    <mc:Fallback>
+      <p:transition spd="slow" advClick="0" advTm="3000">
+        <p:fade/>
+      </p:transition>
+    </mc:Fallback>
+  </mc:AlternateContent>
   <p:timing>
     <p:tnLst>
       <p:par>
@@ -10293,6 +10404,32 @@
                             </p:childTnLst>
                           </p:cTn>
                         </p:par>
+                        <p:par>
+                          <p:cTn id="11" fill="hold">
+                            <p:stCondLst>
+                              <p:cond delay="3080"/>
+                            </p:stCondLst>
+                            <p:childTnLst>
+                              <p:par>
+                                <p:cTn id="12" presetID="1" presetClass="mediacall" presetSubtype="0" fill="hold" nodeType="afterEffect">
+                                  <p:stCondLst>
+                                    <p:cond delay="0"/>
+                                  </p:stCondLst>
+                                  <p:childTnLst>
+                                    <p:cmd type="call" cmd="playFrom(0.0)">
+                                      <p:cBhvr>
+                                        <p:cTn id="13" dur="8213" fill="hold"/>
+                                        <p:tgtEl>
+                                          <p:spTgt spid="2"/>
+                                        </p:tgtEl>
+                                      </p:cBhvr>
+                                    </p:cmd>
+                                  </p:childTnLst>
+                                </p:cTn>
+                              </p:par>
+                            </p:childTnLst>
+                          </p:cTn>
+                        </p:par>
                       </p:childTnLst>
                     </p:cTn>
                   </p:par>
@@ -10313,6 +10450,25 @@
                 </p:cond>
               </p:nextCondLst>
             </p:seq>
+            <p:audio>
+              <p:cMediaNode vol="80000" showWhenStopped="0">
+                <p:cTn id="14" fill="hold" display="0">
+                  <p:stCondLst>
+                    <p:cond delay="indefinite"/>
+                  </p:stCondLst>
+                  <p:endCondLst>
+                    <p:cond evt="onStopAudio" delay="0">
+                      <p:tgtEl>
+                        <p:sldTgt/>
+                      </p:tgtEl>
+                    </p:cond>
+                  </p:endCondLst>
+                </p:cTn>
+                <p:tgtEl>
+                  <p:spTgt spid="2"/>
+                </p:tgtEl>
+              </p:cMediaNode>
+            </p:audio>
           </p:childTnLst>
         </p:cTn>
       </p:par>
@@ -10510,7 +10666,7 @@
           <p:nvPr/>
         </p:nvPicPr>
         <p:blipFill>
-          <a:blip r:embed="rId3">
+          <a:blip r:embed="rId5">
             <a:extLst>
               <a:ext uri="{28A0092B-C50C-407E-A947-70E740481C1C}">
                 <a14:useLocalDpi xmlns:a14="http://schemas.microsoft.com/office/drawing/2010/main" val="0"/>
@@ -10540,7 +10696,7 @@
           <p:nvPr/>
         </p:nvPicPr>
         <p:blipFill rotWithShape="1">
-          <a:blip r:embed="rId4">
+          <a:blip r:embed="rId6">
             <a:extLst>
               <a:ext uri="{28A0092B-C50C-407E-A947-70E740481C1C}">
                 <a14:useLocalDpi xmlns:a14="http://schemas.microsoft.com/office/drawing/2010/main" val="0"/>
@@ -10569,7 +10725,7 @@
           <p:nvPr/>
         </p:nvPicPr>
         <p:blipFill>
-          <a:blip r:embed="rId5">
+          <a:blip r:embed="rId7">
             <a:extLst>
               <a:ext uri="{28A0092B-C50C-407E-A947-70E740481C1C}">
                 <a14:useLocalDpi xmlns:a14="http://schemas.microsoft.com/office/drawing/2010/main" val="0"/>
@@ -10599,7 +10755,7 @@
           <p:nvPr/>
         </p:nvPicPr>
         <p:blipFill>
-          <a:blip r:embed="rId6">
+          <a:blip r:embed="rId8">
             <a:extLst>
               <a:ext uri="{28A0092B-C50C-407E-A947-70E740481C1C}">
                 <a14:useLocalDpi xmlns:a14="http://schemas.microsoft.com/office/drawing/2010/main" val="0"/>
@@ -10629,7 +10785,7 @@
           <p:nvPr/>
         </p:nvPicPr>
         <p:blipFill>
-          <a:blip r:embed="rId7">
+          <a:blip r:embed="rId9">
             <a:extLst>
               <a:ext uri="{28A0092B-C50C-407E-A947-70E740481C1C}">
                 <a14:useLocalDpi xmlns:a14="http://schemas.microsoft.com/office/drawing/2010/main" val="0"/>
@@ -10966,19 +11122,148 @@
           </a:p>
         </p:txBody>
       </p:sp>
+      <p:pic>
+        <p:nvPicPr>
+          <p:cNvPr id="12" name="1 Mar, 10.11(2)">
+            <a:hlinkClick r:id="" action="ppaction://media"/>
+            <a:extLst>
+              <a:ext uri="{FF2B5EF4-FFF2-40B4-BE49-F238E27FC236}">
+                <a16:creationId xmlns:a16="http://schemas.microsoft.com/office/drawing/2014/main" id="{129B2762-08C6-40F6-B235-8D6593CBE4FF}"/>
+              </a:ext>
+            </a:extLst>
+          </p:cNvPr>
+          <p:cNvPicPr>
+            <a:picLocks noChangeAspect="1"/>
+          </p:cNvPicPr>
+          <p:nvPr>
+            <a:audioFile r:link="rId2"/>
+            <p:extLst>
+              <p:ext uri="{DAA4B4D4-6D71-4841-9C94-3DE7FCFB9230}">
+                <p14:media xmlns:p14="http://schemas.microsoft.com/office/powerpoint/2010/main" r:embed="rId1"/>
+              </p:ext>
+            </p:extLst>
+          </p:nvPr>
+        </p:nvPicPr>
+        <p:blipFill>
+          <a:blip r:embed="rId10"/>
+          <a:stretch>
+            <a:fillRect/>
+          </a:stretch>
+        </p:blipFill>
+        <p:spPr>
+          <a:xfrm>
+            <a:off x="42111" y="4545663"/>
+            <a:ext cx="609600" cy="609600"/>
+          </a:xfrm>
+          <a:prstGeom prst="rect">
+            <a:avLst/>
+          </a:prstGeom>
+        </p:spPr>
+      </p:pic>
     </p:spTree>
   </p:cSld>
   <p:clrMapOvr>
     <a:masterClrMapping/>
   </p:clrMapOvr>
-  <mc:AlternateContent xmlns:mc="http://schemas.openxmlformats.org/markup-compatibility/2006" xmlns:p14="http://schemas.microsoft.com/office/powerpoint/2010/main">
-    <mc:Choice Requires="p14">
-      <p:transition p14:dur="10"/>
+  <mc:AlternateContent xmlns:mc="http://schemas.openxmlformats.org/markup-compatibility/2006">
+    <mc:Choice xmlns:p159="http://schemas.microsoft.com/office/powerpoint/2015/09/main" Requires="p159">
+      <p:transition xmlns:p14="http://schemas.microsoft.com/office/powerpoint/2010/main" spd="slow" p14:dur="2000" advClick="0" advTm="3000">
+        <p159:morph option="byObject"/>
+      </p:transition>
     </mc:Choice>
-    <mc:Fallback xmlns="">
-      <p:transition/>
+    <mc:Fallback>
+      <p:transition spd="slow" advClick="0" advTm="3000">
+        <p:fade/>
+      </p:transition>
     </mc:Fallback>
   </mc:AlternateContent>
+  <p:timing>
+    <p:tnLst>
+      <p:par>
+        <p:cTn id="1" dur="indefinite" restart="never" nodeType="tmRoot">
+          <p:childTnLst>
+            <p:seq concurrent="1" nextAc="seek">
+              <p:cTn id="2" dur="indefinite" nodeType="mainSeq">
+                <p:childTnLst>
+                  <p:par>
+                    <p:cTn id="3" fill="hold">
+                      <p:stCondLst>
+                        <p:cond delay="indefinite"/>
+                        <p:cond evt="onBegin" delay="0">
+                          <p:tn val="2"/>
+                        </p:cond>
+                      </p:stCondLst>
+                      <p:childTnLst>
+                        <p:par>
+                          <p:cTn id="4" fill="hold">
+                            <p:stCondLst>
+                              <p:cond delay="0"/>
+                            </p:stCondLst>
+                            <p:childTnLst>
+                              <p:par>
+                                <p:cTn id="5" presetID="1" presetClass="mediacall" presetSubtype="0" fill="hold" nodeType="afterEffect">
+                                  <p:stCondLst>
+                                    <p:cond delay="0"/>
+                                  </p:stCondLst>
+                                  <p:childTnLst>
+                                    <p:cmd type="call" cmd="playFrom(0.0)">
+                                      <p:cBhvr>
+                                        <p:cTn id="6" dur="13482" fill="hold"/>
+                                        <p:tgtEl>
+                                          <p:spTgt spid="12"/>
+                                        </p:tgtEl>
+                                      </p:cBhvr>
+                                    </p:cmd>
+                                  </p:childTnLst>
+                                </p:cTn>
+                              </p:par>
+                            </p:childTnLst>
+                          </p:cTn>
+                        </p:par>
+                      </p:childTnLst>
+                    </p:cTn>
+                  </p:par>
+                </p:childTnLst>
+              </p:cTn>
+              <p:prevCondLst>
+                <p:cond evt="onPrev" delay="0">
+                  <p:tgtEl>
+                    <p:sldTgt/>
+                  </p:tgtEl>
+                </p:cond>
+              </p:prevCondLst>
+              <p:nextCondLst>
+                <p:cond evt="onNext" delay="0">
+                  <p:tgtEl>
+                    <p:sldTgt/>
+                  </p:tgtEl>
+                </p:cond>
+              </p:nextCondLst>
+            </p:seq>
+            <p:audio>
+              <p:cMediaNode vol="80000" showWhenStopped="0">
+                <p:cTn id="7" fill="hold" display="0">
+                  <p:stCondLst>
+                    <p:cond delay="indefinite"/>
+                  </p:stCondLst>
+                  <p:endCondLst>
+                    <p:cond evt="onStopAudio" delay="0">
+                      <p:tgtEl>
+                        <p:sldTgt/>
+                      </p:tgtEl>
+                    </p:cond>
+                  </p:endCondLst>
+                </p:cTn>
+                <p:tgtEl>
+                  <p:spTgt spid="12"/>
+                </p:tgtEl>
+              </p:cMediaNode>
+            </p:audio>
+          </p:childTnLst>
+        </p:cTn>
+      </p:par>
+    </p:tnLst>
+  </p:timing>
 </p:sld>
 </file>
 
@@ -11236,7 +11521,7 @@
           <p:nvPr/>
         </p:nvPicPr>
         <p:blipFill rotWithShape="1">
-          <a:blip r:embed="rId3">
+          <a:blip r:embed="rId5">
             <a:extLst>
               <a:ext uri="{28A0092B-C50C-407E-A947-70E740481C1C}">
                 <a14:useLocalDpi xmlns:a14="http://schemas.microsoft.com/office/drawing/2010/main" val="0"/>
@@ -11281,7 +11566,7 @@
           <p:nvPr/>
         </p:nvPicPr>
         <p:blipFill rotWithShape="1">
-          <a:blip r:embed="rId4">
+          <a:blip r:embed="rId6">
             <a:extLst>
               <a:ext uri="{28A0092B-C50C-407E-A947-70E740481C1C}">
                 <a14:useLocalDpi xmlns:a14="http://schemas.microsoft.com/office/drawing/2010/main" val="0"/>
@@ -11363,11 +11648,148 @@
           </a:fontRef>
         </p:style>
       </p:cxnSp>
+      <p:pic>
+        <p:nvPicPr>
+          <p:cNvPr id="2" name="20210301_095227">
+            <a:hlinkClick r:id="" action="ppaction://media"/>
+            <a:extLst>
+              <a:ext uri="{FF2B5EF4-FFF2-40B4-BE49-F238E27FC236}">
+                <a16:creationId xmlns:a16="http://schemas.microsoft.com/office/drawing/2014/main" id="{833F1D9F-211F-498A-BCC7-095793A47B44}"/>
+              </a:ext>
+            </a:extLst>
+          </p:cNvPr>
+          <p:cNvPicPr>
+            <a:picLocks noChangeAspect="1"/>
+          </p:cNvPicPr>
+          <p:nvPr>
+            <a:audioFile r:link="rId2"/>
+            <p:extLst>
+              <p:ext uri="{DAA4B4D4-6D71-4841-9C94-3DE7FCFB9230}">
+                <p14:media xmlns:p14="http://schemas.microsoft.com/office/powerpoint/2010/main" r:embed="rId1"/>
+              </p:ext>
+            </p:extLst>
+          </p:nvPr>
+        </p:nvPicPr>
+        <p:blipFill>
+          <a:blip r:embed="rId7"/>
+          <a:stretch>
+            <a:fillRect/>
+          </a:stretch>
+        </p:blipFill>
+        <p:spPr>
+          <a:xfrm>
+            <a:off x="38100" y="4498884"/>
+            <a:ext cx="609600" cy="609600"/>
+          </a:xfrm>
+          <a:prstGeom prst="rect">
+            <a:avLst/>
+          </a:prstGeom>
+        </p:spPr>
+      </p:pic>
     </p:spTree>
   </p:cSld>
   <p:clrMapOvr>
     <a:masterClrMapping/>
   </p:clrMapOvr>
+  <mc:AlternateContent xmlns:mc="http://schemas.openxmlformats.org/markup-compatibility/2006">
+    <mc:Choice xmlns:p159="http://schemas.microsoft.com/office/powerpoint/2015/09/main" Requires="p159">
+      <p:transition xmlns:p14="http://schemas.microsoft.com/office/powerpoint/2010/main" spd="slow" p14:dur="2000" advClick="0" advTm="3000">
+        <p159:morph option="byObject"/>
+      </p:transition>
+    </mc:Choice>
+    <mc:Fallback>
+      <p:transition spd="slow" advClick="0" advTm="3000">
+        <p:fade/>
+      </p:transition>
+    </mc:Fallback>
+  </mc:AlternateContent>
+  <p:timing>
+    <p:tnLst>
+      <p:par>
+        <p:cTn id="1" dur="indefinite" restart="never" nodeType="tmRoot">
+          <p:childTnLst>
+            <p:seq concurrent="1" nextAc="seek">
+              <p:cTn id="2" dur="indefinite" nodeType="mainSeq">
+                <p:childTnLst>
+                  <p:par>
+                    <p:cTn id="3" fill="hold">
+                      <p:stCondLst>
+                        <p:cond delay="indefinite"/>
+                        <p:cond evt="onBegin" delay="0">
+                          <p:tn val="2"/>
+                        </p:cond>
+                      </p:stCondLst>
+                      <p:childTnLst>
+                        <p:par>
+                          <p:cTn id="4" fill="hold">
+                            <p:stCondLst>
+                              <p:cond delay="0"/>
+                            </p:stCondLst>
+                            <p:childTnLst>
+                              <p:par>
+                                <p:cTn id="5" presetID="1" presetClass="mediacall" presetSubtype="0" fill="hold" nodeType="afterEffect">
+                                  <p:stCondLst>
+                                    <p:cond delay="0"/>
+                                  </p:stCondLst>
+                                  <p:childTnLst>
+                                    <p:cmd type="call" cmd="playFrom(0.0)">
+                                      <p:cBhvr>
+                                        <p:cTn id="6" dur="32192" fill="hold"/>
+                                        <p:tgtEl>
+                                          <p:spTgt spid="2"/>
+                                        </p:tgtEl>
+                                      </p:cBhvr>
+                                    </p:cmd>
+                                  </p:childTnLst>
+                                </p:cTn>
+                              </p:par>
+                            </p:childTnLst>
+                          </p:cTn>
+                        </p:par>
+                      </p:childTnLst>
+                    </p:cTn>
+                  </p:par>
+                </p:childTnLst>
+              </p:cTn>
+              <p:prevCondLst>
+                <p:cond evt="onPrev" delay="0">
+                  <p:tgtEl>
+                    <p:sldTgt/>
+                  </p:tgtEl>
+                </p:cond>
+              </p:prevCondLst>
+              <p:nextCondLst>
+                <p:cond evt="onNext" delay="0">
+                  <p:tgtEl>
+                    <p:sldTgt/>
+                  </p:tgtEl>
+                </p:cond>
+              </p:nextCondLst>
+            </p:seq>
+            <p:audio>
+              <p:cMediaNode vol="80000" showWhenStopped="0">
+                <p:cTn id="7" fill="hold" display="0">
+                  <p:stCondLst>
+                    <p:cond delay="indefinite"/>
+                  </p:stCondLst>
+                  <p:endCondLst>
+                    <p:cond evt="onStopAudio" delay="0">
+                      <p:tgtEl>
+                        <p:sldTgt/>
+                      </p:tgtEl>
+                    </p:cond>
+                  </p:endCondLst>
+                </p:cTn>
+                <p:tgtEl>
+                  <p:spTgt spid="2"/>
+                </p:tgtEl>
+              </p:cMediaNode>
+            </p:audio>
+          </p:childTnLst>
+        </p:cTn>
+      </p:par>
+    </p:tnLst>
+  </p:timing>
 </p:sld>
 </file>
 
@@ -11682,7 +12104,7 @@
           <p:nvPr/>
         </p:nvPicPr>
         <p:blipFill rotWithShape="1">
-          <a:blip r:embed="rId3">
+          <a:blip r:embed="rId5">
             <a:extLst>
               <a:ext uri="{28A0092B-C50C-407E-A947-70E740481C1C}">
                 <a14:useLocalDpi xmlns:a14="http://schemas.microsoft.com/office/drawing/2010/main" val="0"/>
@@ -11727,7 +12149,7 @@
           <p:nvPr/>
         </p:nvPicPr>
         <p:blipFill>
-          <a:blip r:embed="rId4"/>
+          <a:blip r:embed="rId6"/>
           <a:stretch>
             <a:fillRect/>
           </a:stretch>
@@ -11809,7 +12231,7 @@
           <p:nvPr/>
         </p:nvPicPr>
         <p:blipFill rotWithShape="1">
-          <a:blip r:embed="rId5">
+          <a:blip r:embed="rId7">
             <a:extLst>
               <a:ext uri="{28A0092B-C50C-407E-A947-70E740481C1C}">
                 <a14:useLocalDpi xmlns:a14="http://schemas.microsoft.com/office/drawing/2010/main" val="0"/>
@@ -11854,7 +12276,7 @@
           <p:nvPr/>
         </p:nvPicPr>
         <p:blipFill>
-          <a:blip r:embed="rId6"/>
+          <a:blip r:embed="rId8"/>
           <a:stretch>
             <a:fillRect/>
           </a:stretch>
@@ -11929,11 +12351,148 @@
           </a:p>
         </p:txBody>
       </p:sp>
+      <p:pic>
+        <p:nvPicPr>
+          <p:cNvPr id="3" name="yessir">
+            <a:hlinkClick r:id="" action="ppaction://media"/>
+            <a:extLst>
+              <a:ext uri="{FF2B5EF4-FFF2-40B4-BE49-F238E27FC236}">
+                <a16:creationId xmlns:a16="http://schemas.microsoft.com/office/drawing/2014/main" id="{0510C02E-8E0B-4EF4-B59E-D7EA23641006}"/>
+              </a:ext>
+            </a:extLst>
+          </p:cNvPr>
+          <p:cNvPicPr>
+            <a:picLocks noChangeAspect="1"/>
+          </p:cNvPicPr>
+          <p:nvPr>
+            <a:audioFile r:link="rId2"/>
+            <p:extLst>
+              <p:ext uri="{DAA4B4D4-6D71-4841-9C94-3DE7FCFB9230}">
+                <p14:media xmlns:p14="http://schemas.microsoft.com/office/powerpoint/2010/main" r:embed="rId1"/>
+              </p:ext>
+            </p:extLst>
+          </p:nvPr>
+        </p:nvPicPr>
+        <p:blipFill>
+          <a:blip r:embed="rId9"/>
+          <a:stretch>
+            <a:fillRect/>
+          </a:stretch>
+        </p:blipFill>
+        <p:spPr>
+          <a:xfrm>
+            <a:off x="38100" y="4531607"/>
+            <a:ext cx="609600" cy="609600"/>
+          </a:xfrm>
+          <a:prstGeom prst="rect">
+            <a:avLst/>
+          </a:prstGeom>
+        </p:spPr>
+      </p:pic>
     </p:spTree>
   </p:cSld>
   <p:clrMapOvr>
     <a:masterClrMapping/>
   </p:clrMapOvr>
+  <mc:AlternateContent xmlns:mc="http://schemas.openxmlformats.org/markup-compatibility/2006">
+    <mc:Choice xmlns:p159="http://schemas.microsoft.com/office/powerpoint/2015/09/main" Requires="p159">
+      <p:transition xmlns:p14="http://schemas.microsoft.com/office/powerpoint/2010/main" spd="slow" p14:dur="2000" advClick="0" advTm="3000">
+        <p159:morph option="byObject"/>
+      </p:transition>
+    </mc:Choice>
+    <mc:Fallback>
+      <p:transition spd="slow" advClick="0" advTm="3000">
+        <p:fade/>
+      </p:transition>
+    </mc:Fallback>
+  </mc:AlternateContent>
+  <p:timing>
+    <p:tnLst>
+      <p:par>
+        <p:cTn id="1" dur="indefinite" restart="never" nodeType="tmRoot">
+          <p:childTnLst>
+            <p:seq concurrent="1" nextAc="seek">
+              <p:cTn id="2" dur="indefinite" nodeType="mainSeq">
+                <p:childTnLst>
+                  <p:par>
+                    <p:cTn id="3" fill="hold">
+                      <p:stCondLst>
+                        <p:cond delay="indefinite"/>
+                        <p:cond evt="onBegin" delay="0">
+                          <p:tn val="2"/>
+                        </p:cond>
+                      </p:stCondLst>
+                      <p:childTnLst>
+                        <p:par>
+                          <p:cTn id="4" fill="hold">
+                            <p:stCondLst>
+                              <p:cond delay="0"/>
+                            </p:stCondLst>
+                            <p:childTnLst>
+                              <p:par>
+                                <p:cTn id="5" presetID="1" presetClass="mediacall" presetSubtype="0" fill="hold" nodeType="afterEffect">
+                                  <p:stCondLst>
+                                    <p:cond delay="0"/>
+                                  </p:stCondLst>
+                                  <p:childTnLst>
+                                    <p:cmd type="call" cmd="playFrom(0.0)">
+                                      <p:cBhvr>
+                                        <p:cTn id="6" dur="37459" fill="hold"/>
+                                        <p:tgtEl>
+                                          <p:spTgt spid="3"/>
+                                        </p:tgtEl>
+                                      </p:cBhvr>
+                                    </p:cmd>
+                                  </p:childTnLst>
+                                </p:cTn>
+                              </p:par>
+                            </p:childTnLst>
+                          </p:cTn>
+                        </p:par>
+                      </p:childTnLst>
+                    </p:cTn>
+                  </p:par>
+                </p:childTnLst>
+              </p:cTn>
+              <p:prevCondLst>
+                <p:cond evt="onPrev" delay="0">
+                  <p:tgtEl>
+                    <p:sldTgt/>
+                  </p:tgtEl>
+                </p:cond>
+              </p:prevCondLst>
+              <p:nextCondLst>
+                <p:cond evt="onNext" delay="0">
+                  <p:tgtEl>
+                    <p:sldTgt/>
+                  </p:tgtEl>
+                </p:cond>
+              </p:nextCondLst>
+            </p:seq>
+            <p:audio>
+              <p:cMediaNode vol="80000" showWhenStopped="0">
+                <p:cTn id="7" fill="hold" display="0">
+                  <p:stCondLst>
+                    <p:cond delay="indefinite"/>
+                  </p:stCondLst>
+                  <p:endCondLst>
+                    <p:cond evt="onStopAudio" delay="0">
+                      <p:tgtEl>
+                        <p:sldTgt/>
+                      </p:tgtEl>
+                    </p:cond>
+                  </p:endCondLst>
+                </p:cTn>
+                <p:tgtEl>
+                  <p:spTgt spid="3"/>
+                </p:tgtEl>
+              </p:cMediaNode>
+            </p:audio>
+          </p:childTnLst>
+        </p:cTn>
+      </p:par>
+    </p:tnLst>
+  </p:timing>
 </p:sld>
 </file>
 
@@ -12118,11 +12677,11 @@
           <p:nvPr/>
         </p:nvPicPr>
         <p:blipFill>
-          <a:blip r:embed="rId3">
+          <a:blip r:embed="rId5">
             <a:extLst>
               <a:ext uri="{BEBA8EAE-BF5A-486C-A8C5-ECC9F3942E4B}">
                 <a14:imgProps xmlns:a14="http://schemas.microsoft.com/office/drawing/2010/main">
-                  <a14:imgLayer r:embed="rId4">
+                  <a14:imgLayer r:embed="rId6">
                     <a14:imgEffect>
                       <a14:backgroundRemoval t="10000" b="90000" l="10000" r="90000"/>
                     </a14:imgEffect>
@@ -12157,7 +12716,7 @@
           <p:nvPr/>
         </p:nvPicPr>
         <p:blipFill>
-          <a:blip r:embed="rId5">
+          <a:blip r:embed="rId7">
             <a:clrChange>
               <a:clrFrom>
                 <a:srgbClr val="FFFFFF"/>
@@ -12197,11 +12756,11 @@
           <p:nvPr/>
         </p:nvPicPr>
         <p:blipFill>
-          <a:blip r:embed="rId6">
+          <a:blip r:embed="rId8">
             <a:extLst>
               <a:ext uri="{BEBA8EAE-BF5A-486C-A8C5-ECC9F3942E4B}">
                 <a14:imgProps xmlns:a14="http://schemas.microsoft.com/office/drawing/2010/main">
-                  <a14:imgLayer r:embed="rId7">
+                  <a14:imgLayer r:embed="rId9">
                     <a14:imgEffect>
                       <a14:backgroundRemoval t="10000" b="90000" l="10000" r="90000">
                         <a14:foregroundMark x1="72283" y1="38315" x2="67799" y2="36277"/>
@@ -12238,11 +12797,11 @@
           <p:nvPr/>
         </p:nvPicPr>
         <p:blipFill>
-          <a:blip r:embed="rId8">
+          <a:blip r:embed="rId10">
             <a:extLst>
               <a:ext uri="{BEBA8EAE-BF5A-486C-A8C5-ECC9F3942E4B}">
                 <a14:imgProps xmlns:a14="http://schemas.microsoft.com/office/drawing/2010/main">
-                  <a14:imgLayer r:embed="rId9">
+                  <a14:imgLayer r:embed="rId11">
                     <a14:imgEffect>
                       <a14:backgroundRemoval t="10000" b="90000" l="10000" r="90000"/>
                     </a14:imgEffect>
@@ -12277,7 +12836,7 @@
           <p:nvPr/>
         </p:nvPicPr>
         <p:blipFill>
-          <a:blip r:embed="rId10">
+          <a:blip r:embed="rId12">
             <a:extLst>
               <a:ext uri="{28A0092B-C50C-407E-A947-70E740481C1C}">
                 <a14:useLocalDpi xmlns:a14="http://schemas.microsoft.com/office/drawing/2010/main" val="0"/>
@@ -12313,7 +12872,7 @@
           <p:nvPr/>
         </p:nvPicPr>
         <p:blipFill>
-          <a:blip r:embed="rId11">
+          <a:blip r:embed="rId13">
             <a:clrChange>
               <a:clrFrom>
                 <a:srgbClr val="FFFFFF"/>
@@ -12370,7 +12929,7 @@
           <p:nvPr/>
         </p:nvPicPr>
         <p:blipFill>
-          <a:blip r:embed="rId12">
+          <a:blip r:embed="rId14">
             <a:clrChange>
               <a:clrFrom>
                 <a:srgbClr val="FFFFFF"/>
@@ -12427,7 +12986,7 @@
           <p:nvPr/>
         </p:nvPicPr>
         <p:blipFill>
-          <a:blip r:embed="rId13">
+          <a:blip r:embed="rId15">
             <a:extLst>
               <a:ext uri="{28A0092B-C50C-407E-A947-70E740481C1C}">
                 <a14:useLocalDpi xmlns:a14="http://schemas.microsoft.com/office/drawing/2010/main" val="0"/>
@@ -12474,7 +13033,7 @@
           <p:nvPr/>
         </p:nvPicPr>
         <p:blipFill>
-          <a:blip r:embed="rId14">
+          <a:blip r:embed="rId16">
             <a:extLst>
               <a:ext uri="{28A0092B-C50C-407E-A947-70E740481C1C}">
                 <a14:useLocalDpi xmlns:a14="http://schemas.microsoft.com/office/drawing/2010/main" val="0"/>
@@ -12521,7 +13080,7 @@
           <p:nvPr/>
         </p:nvPicPr>
         <p:blipFill>
-          <a:blip r:embed="rId15">
+          <a:blip r:embed="rId17">
             <a:extLst>
               <a:ext uri="{28A0092B-C50C-407E-A947-70E740481C1C}">
                 <a14:useLocalDpi xmlns:a14="http://schemas.microsoft.com/office/drawing/2010/main" val="0"/>
@@ -12568,7 +13127,7 @@
           <p:nvPr/>
         </p:nvPicPr>
         <p:blipFill>
-          <a:blip r:embed="rId16">
+          <a:blip r:embed="rId18">
             <a:extLst>
               <a:ext uri="{28A0092B-C50C-407E-A947-70E740481C1C}">
                 <a14:useLocalDpi xmlns:a14="http://schemas.microsoft.com/office/drawing/2010/main" val="0"/>
@@ -12600,11 +13159,148 @@
           </a:extLst>
         </p:spPr>
       </p:pic>
+      <p:pic>
+        <p:nvPicPr>
+          <p:cNvPr id="4" name="zhk Izgrev 10">
+            <a:hlinkClick r:id="" action="ppaction://media"/>
+            <a:extLst>
+              <a:ext uri="{FF2B5EF4-FFF2-40B4-BE49-F238E27FC236}">
+                <a16:creationId xmlns:a16="http://schemas.microsoft.com/office/drawing/2014/main" id="{ECC99F61-21BA-4BD1-8DDE-09E9F8AB54BD}"/>
+              </a:ext>
+            </a:extLst>
+          </p:cNvPr>
+          <p:cNvPicPr>
+            <a:picLocks noChangeAspect="1"/>
+          </p:cNvPicPr>
+          <p:nvPr>
+            <a:audioFile r:link="rId2"/>
+            <p:extLst>
+              <p:ext uri="{DAA4B4D4-6D71-4841-9C94-3DE7FCFB9230}">
+                <p14:media xmlns:p14="http://schemas.microsoft.com/office/powerpoint/2010/main" r:embed="rId1"/>
+              </p:ext>
+            </p:extLst>
+          </p:nvPr>
+        </p:nvPicPr>
+        <p:blipFill>
+          <a:blip r:embed="rId19"/>
+          <a:stretch>
+            <a:fillRect/>
+          </a:stretch>
+        </p:blipFill>
+        <p:spPr>
+          <a:xfrm>
+            <a:off x="75872" y="4554102"/>
+            <a:ext cx="609600" cy="609600"/>
+          </a:xfrm>
+          <a:prstGeom prst="rect">
+            <a:avLst/>
+          </a:prstGeom>
+        </p:spPr>
+      </p:pic>
     </p:spTree>
   </p:cSld>
   <p:clrMapOvr>
     <a:masterClrMapping/>
   </p:clrMapOvr>
+  <mc:AlternateContent xmlns:mc="http://schemas.openxmlformats.org/markup-compatibility/2006">
+    <mc:Choice xmlns:p159="http://schemas.microsoft.com/office/powerpoint/2015/09/main" Requires="p159">
+      <p:transition xmlns:p14="http://schemas.microsoft.com/office/powerpoint/2010/main" spd="slow" p14:dur="2000" advClick="0" advTm="3000">
+        <p159:morph option="byObject"/>
+      </p:transition>
+    </mc:Choice>
+    <mc:Fallback>
+      <p:transition spd="slow" advClick="0" advTm="3000">
+        <p:fade/>
+      </p:transition>
+    </mc:Fallback>
+  </mc:AlternateContent>
+  <p:timing>
+    <p:tnLst>
+      <p:par>
+        <p:cTn id="1" dur="indefinite" restart="never" nodeType="tmRoot">
+          <p:childTnLst>
+            <p:seq concurrent="1" nextAc="seek">
+              <p:cTn id="2" dur="indefinite" nodeType="mainSeq">
+                <p:childTnLst>
+                  <p:par>
+                    <p:cTn id="3" fill="hold">
+                      <p:stCondLst>
+                        <p:cond delay="indefinite"/>
+                        <p:cond evt="onBegin" delay="0">
+                          <p:tn val="2"/>
+                        </p:cond>
+                      </p:stCondLst>
+                      <p:childTnLst>
+                        <p:par>
+                          <p:cTn id="4" fill="hold">
+                            <p:stCondLst>
+                              <p:cond delay="0"/>
+                            </p:stCondLst>
+                            <p:childTnLst>
+                              <p:par>
+                                <p:cTn id="5" presetID="1" presetClass="mediacall" presetSubtype="0" fill="hold" nodeType="afterEffect">
+                                  <p:stCondLst>
+                                    <p:cond delay="0"/>
+                                  </p:stCondLst>
+                                  <p:childTnLst>
+                                    <p:cmd type="call" cmd="playFrom(0.0)">
+                                      <p:cBhvr>
+                                        <p:cTn id="6" dur="30409" fill="hold"/>
+                                        <p:tgtEl>
+                                          <p:spTgt spid="4"/>
+                                        </p:tgtEl>
+                                      </p:cBhvr>
+                                    </p:cmd>
+                                  </p:childTnLst>
+                                </p:cTn>
+                              </p:par>
+                            </p:childTnLst>
+                          </p:cTn>
+                        </p:par>
+                      </p:childTnLst>
+                    </p:cTn>
+                  </p:par>
+                </p:childTnLst>
+              </p:cTn>
+              <p:prevCondLst>
+                <p:cond evt="onPrev" delay="0">
+                  <p:tgtEl>
+                    <p:sldTgt/>
+                  </p:tgtEl>
+                </p:cond>
+              </p:prevCondLst>
+              <p:nextCondLst>
+                <p:cond evt="onNext" delay="0">
+                  <p:tgtEl>
+                    <p:sldTgt/>
+                  </p:tgtEl>
+                </p:cond>
+              </p:nextCondLst>
+            </p:seq>
+            <p:audio>
+              <p:cMediaNode vol="80000" showWhenStopped="0">
+                <p:cTn id="7" fill="hold" display="0">
+                  <p:stCondLst>
+                    <p:cond delay="indefinite"/>
+                  </p:stCondLst>
+                  <p:endCondLst>
+                    <p:cond evt="onStopAudio" delay="0">
+                      <p:tgtEl>
+                        <p:sldTgt/>
+                      </p:tgtEl>
+                    </p:cond>
+                  </p:endCondLst>
+                </p:cTn>
+                <p:tgtEl>
+                  <p:spTgt spid="4"/>
+                </p:tgtEl>
+              </p:cMediaNode>
+            </p:audio>
+          </p:childTnLst>
+        </p:cTn>
+      </p:par>
+    </p:tnLst>
+  </p:timing>
 </p:sld>
 </file>
 
@@ -12887,7 +13583,7 @@
           <p:nvPr/>
         </p:nvPicPr>
         <p:blipFill rotWithShape="1">
-          <a:blip r:embed="rId3"/>
+          <a:blip r:embed="rId5"/>
           <a:srcRect l="17243" r="9816" b="2"/>
           <a:stretch/>
         </p:blipFill>
@@ -12901,11 +13597,148 @@
           </a:prstGeom>
         </p:spPr>
       </p:pic>
+      <p:pic>
+        <p:nvPicPr>
+          <p:cNvPr id="3" name="Project">
+            <a:hlinkClick r:id="" action="ppaction://media"/>
+            <a:extLst>
+              <a:ext uri="{FF2B5EF4-FFF2-40B4-BE49-F238E27FC236}">
+                <a16:creationId xmlns:a16="http://schemas.microsoft.com/office/drawing/2014/main" id="{8C27E1E5-916E-478B-B2AE-8BF054F577D6}"/>
+              </a:ext>
+            </a:extLst>
+          </p:cNvPr>
+          <p:cNvPicPr>
+            <a:picLocks noChangeAspect="1"/>
+          </p:cNvPicPr>
+          <p:nvPr>
+            <a:audioFile r:link="rId2"/>
+            <p:extLst>
+              <p:ext uri="{DAA4B4D4-6D71-4841-9C94-3DE7FCFB9230}">
+                <p14:media xmlns:p14="http://schemas.microsoft.com/office/powerpoint/2010/main" r:embed="rId1"/>
+              </p:ext>
+            </p:extLst>
+          </p:nvPr>
+        </p:nvPicPr>
+        <p:blipFill>
+          <a:blip r:embed="rId6"/>
+          <a:stretch>
+            <a:fillRect/>
+          </a:stretch>
+        </p:blipFill>
+        <p:spPr>
+          <a:xfrm>
+            <a:off x="117306" y="4520749"/>
+            <a:ext cx="609600" cy="609600"/>
+          </a:xfrm>
+          <a:prstGeom prst="rect">
+            <a:avLst/>
+          </a:prstGeom>
+        </p:spPr>
+      </p:pic>
     </p:spTree>
   </p:cSld>
   <p:clrMapOvr>
     <a:masterClrMapping/>
   </p:clrMapOvr>
+  <mc:AlternateContent xmlns:mc="http://schemas.openxmlformats.org/markup-compatibility/2006">
+    <mc:Choice xmlns:p159="http://schemas.microsoft.com/office/powerpoint/2015/09/main" Requires="p159">
+      <p:transition xmlns:p14="http://schemas.microsoft.com/office/powerpoint/2010/main" spd="slow" p14:dur="2000" advClick="0" advTm="3000">
+        <p159:morph option="byObject"/>
+      </p:transition>
+    </mc:Choice>
+    <mc:Fallback>
+      <p:transition spd="slow" advClick="0" advTm="3000">
+        <p:fade/>
+      </p:transition>
+    </mc:Fallback>
+  </mc:AlternateContent>
+  <p:timing>
+    <p:tnLst>
+      <p:par>
+        <p:cTn id="1" dur="indefinite" restart="never" nodeType="tmRoot">
+          <p:childTnLst>
+            <p:seq concurrent="1" nextAc="seek">
+              <p:cTn id="2" dur="indefinite" nodeType="mainSeq">
+                <p:childTnLst>
+                  <p:par>
+                    <p:cTn id="3" fill="hold">
+                      <p:stCondLst>
+                        <p:cond delay="indefinite"/>
+                        <p:cond evt="onBegin" delay="0">
+                          <p:tn val="2"/>
+                        </p:cond>
+                      </p:stCondLst>
+                      <p:childTnLst>
+                        <p:par>
+                          <p:cTn id="4" fill="hold">
+                            <p:stCondLst>
+                              <p:cond delay="0"/>
+                            </p:stCondLst>
+                            <p:childTnLst>
+                              <p:par>
+                                <p:cTn id="5" presetID="1" presetClass="mediacall" presetSubtype="0" fill="hold" nodeType="afterEffect">
+                                  <p:stCondLst>
+                                    <p:cond delay="0"/>
+                                  </p:stCondLst>
+                                  <p:childTnLst>
+                                    <p:cmd type="call" cmd="playFrom(0.0)">
+                                      <p:cBhvr>
+                                        <p:cTn id="6" dur="27240" fill="hold"/>
+                                        <p:tgtEl>
+                                          <p:spTgt spid="3"/>
+                                        </p:tgtEl>
+                                      </p:cBhvr>
+                                    </p:cmd>
+                                  </p:childTnLst>
+                                </p:cTn>
+                              </p:par>
+                            </p:childTnLst>
+                          </p:cTn>
+                        </p:par>
+                      </p:childTnLst>
+                    </p:cTn>
+                  </p:par>
+                </p:childTnLst>
+              </p:cTn>
+              <p:prevCondLst>
+                <p:cond evt="onPrev" delay="0">
+                  <p:tgtEl>
+                    <p:sldTgt/>
+                  </p:tgtEl>
+                </p:cond>
+              </p:prevCondLst>
+              <p:nextCondLst>
+                <p:cond evt="onNext" delay="0">
+                  <p:tgtEl>
+                    <p:sldTgt/>
+                  </p:tgtEl>
+                </p:cond>
+              </p:nextCondLst>
+            </p:seq>
+            <p:audio>
+              <p:cMediaNode vol="80000" showWhenStopped="0">
+                <p:cTn id="7" fill="hold" display="0">
+                  <p:stCondLst>
+                    <p:cond delay="indefinite"/>
+                  </p:stCondLst>
+                  <p:endCondLst>
+                    <p:cond evt="onStopAudio" delay="0">
+                      <p:tgtEl>
+                        <p:sldTgt/>
+                      </p:tgtEl>
+                    </p:cond>
+                  </p:endCondLst>
+                </p:cTn>
+                <p:tgtEl>
+                  <p:spTgt spid="3"/>
+                </p:tgtEl>
+              </p:cMediaNode>
+            </p:audio>
+          </p:childTnLst>
+        </p:cTn>
+      </p:par>
+    </p:tnLst>
+  </p:timing>
 </p:sld>
 </file>
 
@@ -13103,11 +13936,148 @@
           </a:p>
         </p:txBody>
       </p:sp>
+      <p:pic>
+        <p:nvPicPr>
+          <p:cNvPr id="4" name="zhk Izgrev 11">
+            <a:hlinkClick r:id="" action="ppaction://media"/>
+            <a:extLst>
+              <a:ext uri="{FF2B5EF4-FFF2-40B4-BE49-F238E27FC236}">
+                <a16:creationId xmlns:a16="http://schemas.microsoft.com/office/drawing/2014/main" id="{154C86EE-1B2F-43DB-A49F-5CEB4F2D29AB}"/>
+              </a:ext>
+            </a:extLst>
+          </p:cNvPr>
+          <p:cNvPicPr>
+            <a:picLocks noChangeAspect="1"/>
+          </p:cNvPicPr>
+          <p:nvPr>
+            <a:audioFile r:link="rId2"/>
+            <p:extLst>
+              <p:ext uri="{DAA4B4D4-6D71-4841-9C94-3DE7FCFB9230}">
+                <p14:media xmlns:p14="http://schemas.microsoft.com/office/powerpoint/2010/main" r:embed="rId1"/>
+              </p:ext>
+            </p:extLst>
+          </p:nvPr>
+        </p:nvPicPr>
+        <p:blipFill>
+          <a:blip r:embed="rId5"/>
+          <a:stretch>
+            <a:fillRect/>
+          </a:stretch>
+        </p:blipFill>
+        <p:spPr>
+          <a:xfrm>
+            <a:off x="8021" y="4533900"/>
+            <a:ext cx="609600" cy="609600"/>
+          </a:xfrm>
+          <a:prstGeom prst="rect">
+            <a:avLst/>
+          </a:prstGeom>
+        </p:spPr>
+      </p:pic>
     </p:spTree>
   </p:cSld>
   <p:clrMapOvr>
     <a:masterClrMapping/>
   </p:clrMapOvr>
+  <mc:AlternateContent xmlns:mc="http://schemas.openxmlformats.org/markup-compatibility/2006">
+    <mc:Choice xmlns:p159="http://schemas.microsoft.com/office/powerpoint/2015/09/main" Requires="p159">
+      <p:transition xmlns:p14="http://schemas.microsoft.com/office/powerpoint/2010/main" spd="slow" p14:dur="2000" advClick="0" advTm="3000">
+        <p159:morph option="byObject"/>
+      </p:transition>
+    </mc:Choice>
+    <mc:Fallback>
+      <p:transition spd="slow" advClick="0" advTm="3000">
+        <p:fade/>
+      </p:transition>
+    </mc:Fallback>
+  </mc:AlternateContent>
+  <p:timing>
+    <p:tnLst>
+      <p:par>
+        <p:cTn id="1" dur="indefinite" restart="never" nodeType="tmRoot">
+          <p:childTnLst>
+            <p:seq concurrent="1" nextAc="seek">
+              <p:cTn id="2" dur="indefinite" nodeType="mainSeq">
+                <p:childTnLst>
+                  <p:par>
+                    <p:cTn id="3" fill="hold">
+                      <p:stCondLst>
+                        <p:cond delay="indefinite"/>
+                        <p:cond evt="onBegin" delay="0">
+                          <p:tn val="2"/>
+                        </p:cond>
+                      </p:stCondLst>
+                      <p:childTnLst>
+                        <p:par>
+                          <p:cTn id="4" fill="hold">
+                            <p:stCondLst>
+                              <p:cond delay="0"/>
+                            </p:stCondLst>
+                            <p:childTnLst>
+                              <p:par>
+                                <p:cTn id="5" presetID="1" presetClass="mediacall" presetSubtype="0" fill="hold" nodeType="afterEffect">
+                                  <p:stCondLst>
+                                    <p:cond delay="0"/>
+                                  </p:stCondLst>
+                                  <p:childTnLst>
+                                    <p:cmd type="call" cmd="playFrom(0.0)">
+                                      <p:cBhvr>
+                                        <p:cTn id="6" dur="2736" fill="hold"/>
+                                        <p:tgtEl>
+                                          <p:spTgt spid="4"/>
+                                        </p:tgtEl>
+                                      </p:cBhvr>
+                                    </p:cmd>
+                                  </p:childTnLst>
+                                </p:cTn>
+                              </p:par>
+                            </p:childTnLst>
+                          </p:cTn>
+                        </p:par>
+                      </p:childTnLst>
+                    </p:cTn>
+                  </p:par>
+                </p:childTnLst>
+              </p:cTn>
+              <p:prevCondLst>
+                <p:cond evt="onPrev" delay="0">
+                  <p:tgtEl>
+                    <p:sldTgt/>
+                  </p:tgtEl>
+                </p:cond>
+              </p:prevCondLst>
+              <p:nextCondLst>
+                <p:cond evt="onNext" delay="0">
+                  <p:tgtEl>
+                    <p:sldTgt/>
+                  </p:tgtEl>
+                </p:cond>
+              </p:nextCondLst>
+            </p:seq>
+            <p:audio>
+              <p:cMediaNode vol="80000" showWhenStopped="0">
+                <p:cTn id="7" fill="hold" display="0">
+                  <p:stCondLst>
+                    <p:cond delay="indefinite"/>
+                  </p:stCondLst>
+                  <p:endCondLst>
+                    <p:cond evt="onStopAudio" delay="0">
+                      <p:tgtEl>
+                        <p:sldTgt/>
+                      </p:tgtEl>
+                    </p:cond>
+                  </p:endCondLst>
+                </p:cTn>
+                <p:tgtEl>
+                  <p:spTgt spid="4"/>
+                </p:tgtEl>
+              </p:cMediaNode>
+            </p:audio>
+          </p:childTnLst>
+        </p:cTn>
+      </p:par>
+    </p:tnLst>
+  </p:timing>
 </p:sld>
 </file>
 

</xml_diff>